<commit_message>
Added Objectives for Philippine Datasets in PPT
</commit_message>
<xml_diff>
--- a/Final PPT Template.pptx
+++ b/Final PPT Template.pptx
@@ -3463,51 +3463,349 @@
       </p:sp>
       <p:sp>
         <p:nvSpPr>
-          <p:cNvPr id="32" name="Rectangle 31">
+          <p:cNvPr id="20" name="TextBox 19">
             <a:extLst>
               <a:ext uri="{FF2B5EF4-FFF2-40B4-BE49-F238E27FC236}">
-                <a16:creationId xmlns:a16="http://schemas.microsoft.com/office/drawing/2014/main" id="{D8032073-7D5D-46AA-815A-7537B2C076BF}"/>
+                <a16:creationId xmlns:a16="http://schemas.microsoft.com/office/drawing/2014/main" id="{F732BF55-0D76-C88B-C0A1-CB9A10A14C3C}"/>
               </a:ext>
             </a:extLst>
           </p:cNvPr>
-          <p:cNvSpPr/>
-          <p:nvPr/>
-        </p:nvSpPr>
-        <p:spPr>
-          <a:xfrm>
-            <a:off x="6123710" y="3009900"/>
-            <a:ext cx="11626852" cy="6905872"/>
+          <p:cNvSpPr txBox="1"/>
+          <p:nvPr/>
+        </p:nvSpPr>
+        <p:spPr>
+          <a:xfrm>
+            <a:off x="7082997" y="1047571"/>
+            <a:ext cx="3280203" cy="1200329"/>
           </a:xfrm>
           <a:prstGeom prst="rect">
             <a:avLst/>
           </a:prstGeom>
-        </p:spPr>
-        <p:style>
-          <a:lnRef idx="2">
-            <a:schemeClr val="dk1"/>
-          </a:lnRef>
-          <a:fillRef idx="1">
-            <a:schemeClr val="lt1"/>
-          </a:fillRef>
-          <a:effectRef idx="0">
-            <a:schemeClr val="dk1"/>
-          </a:effectRef>
-          <a:fontRef idx="minor">
-            <a:schemeClr val="dk1"/>
-          </a:fontRef>
-        </p:style>
-        <p:txBody>
-          <a:bodyPr rtlCol="0" anchor="ctr"/>
-          <a:lstStyle/>
-          <a:p>
-            <a:pPr algn="ctr"/>
+          <a:noFill/>
+        </p:spPr>
+        <p:txBody>
+          <a:bodyPr wrap="square" rtlCol="0">
+            <a:spAutoFit/>
+          </a:bodyPr>
+          <a:lstStyle/>
+          <a:p>
             <a:r>
-              <a:rPr lang="en-US" dirty="0"/>
-              <a:t>GRAPH</a:t>
+              <a:rPr lang="en-PH" sz="7200" b="1" i="0" dirty="0">
+                <a:solidFill>
+                  <a:srgbClr val="202124"/>
+                </a:solidFill>
+                <a:effectLst/>
+                <a:latin typeface="Century Gothic" panose="020B0502020202020204" pitchFamily="34" charset="0"/>
+              </a:rPr>
+              <a:t>68,104</a:t>
             </a:r>
-          </a:p>
-        </p:txBody>
-      </p:sp>
+            <a:endParaRPr lang="en-PH" sz="7200" b="1" dirty="0">
+              <a:latin typeface="Century Gothic" panose="020B0502020202020204" pitchFamily="34" charset="0"/>
+            </a:endParaRPr>
+          </a:p>
+        </p:txBody>
+      </p:sp>
+      <p:sp>
+        <p:nvSpPr>
+          <p:cNvPr id="21" name="TextBox 20">
+            <a:extLst>
+              <a:ext uri="{FF2B5EF4-FFF2-40B4-BE49-F238E27FC236}">
+                <a16:creationId xmlns:a16="http://schemas.microsoft.com/office/drawing/2014/main" id="{9C7ECC60-61A1-82FA-D9CD-3470D9789CFF}"/>
+              </a:ext>
+            </a:extLst>
+          </p:cNvPr>
+          <p:cNvSpPr txBox="1"/>
+          <p:nvPr/>
+        </p:nvSpPr>
+        <p:spPr>
+          <a:xfrm>
+            <a:off x="6858000" y="2076390"/>
+            <a:ext cx="3624469" cy="400110"/>
+          </a:xfrm>
+          <a:prstGeom prst="rect">
+            <a:avLst/>
+          </a:prstGeom>
+          <a:noFill/>
+        </p:spPr>
+        <p:txBody>
+          <a:bodyPr wrap="square" rtlCol="0">
+            <a:spAutoFit/>
+          </a:bodyPr>
+          <a:lstStyle/>
+          <a:p>
+            <a:r>
+              <a:rPr lang="en-US" sz="2000" b="1" i="0" dirty="0">
+                <a:solidFill>
+                  <a:srgbClr val="202124"/>
+                </a:solidFill>
+                <a:effectLst/>
+                <a:latin typeface="Century Gothic" panose="020B0502020202020204" pitchFamily="34" charset="0"/>
+              </a:rPr>
+              <a:t>Totally Damaged</a:t>
+            </a:r>
+            <a:r>
+              <a:rPr lang="en-US" sz="2000" b="1" dirty="0">
+                <a:solidFill>
+                  <a:srgbClr val="202124"/>
+                </a:solidFill>
+                <a:latin typeface="Century Gothic" panose="020B0502020202020204" pitchFamily="34" charset="0"/>
+              </a:rPr>
+              <a:t> </a:t>
+            </a:r>
+            <a:r>
+              <a:rPr lang="en-US" sz="2000" b="1" i="0" dirty="0">
+                <a:solidFill>
+                  <a:srgbClr val="202124"/>
+                </a:solidFill>
+                <a:effectLst/>
+                <a:latin typeface="Century Gothic" panose="020B0502020202020204" pitchFamily="34" charset="0"/>
+              </a:rPr>
+              <a:t>Houses</a:t>
+            </a:r>
+            <a:endParaRPr lang="en-PH" sz="2000" b="1" dirty="0">
+              <a:latin typeface="Century Gothic" panose="020B0502020202020204" pitchFamily="34" charset="0"/>
+            </a:endParaRPr>
+          </a:p>
+        </p:txBody>
+      </p:sp>
+      <p:pic>
+        <p:nvPicPr>
+          <p:cNvPr id="22" name="Picture 21">
+            <a:extLst>
+              <a:ext uri="{FF2B5EF4-FFF2-40B4-BE49-F238E27FC236}">
+                <a16:creationId xmlns:a16="http://schemas.microsoft.com/office/drawing/2014/main" id="{DA27BEC3-461D-2FC1-1916-372DCBCFABA2}"/>
+              </a:ext>
+            </a:extLst>
+          </p:cNvPr>
+          <p:cNvPicPr>
+            <a:picLocks noChangeAspect="1"/>
+          </p:cNvPicPr>
+          <p:nvPr/>
+        </p:nvPicPr>
+        <p:blipFill>
+          <a:blip r:embed="rId2" cstate="print">
+            <a:extLst>
+              <a:ext uri="{28A0092B-C50C-407E-A947-70E740481C1C}">
+                <a14:useLocalDpi xmlns:a14="http://schemas.microsoft.com/office/drawing/2010/main" val="0"/>
+              </a:ext>
+            </a:extLst>
+          </a:blip>
+          <a:stretch>
+            <a:fillRect/>
+          </a:stretch>
+        </p:blipFill>
+        <p:spPr>
+          <a:xfrm>
+            <a:off x="10114257" y="1008357"/>
+            <a:ext cx="1315743" cy="1315743"/>
+          </a:xfrm>
+          <a:prstGeom prst="rect">
+            <a:avLst/>
+          </a:prstGeom>
+        </p:spPr>
+      </p:pic>
+      <p:sp>
+        <p:nvSpPr>
+          <p:cNvPr id="26" name="TextBox 25">
+            <a:extLst>
+              <a:ext uri="{FF2B5EF4-FFF2-40B4-BE49-F238E27FC236}">
+                <a16:creationId xmlns:a16="http://schemas.microsoft.com/office/drawing/2014/main" id="{D144AB0E-A685-30A7-E417-01241792E812}"/>
+              </a:ext>
+            </a:extLst>
+          </p:cNvPr>
+          <p:cNvSpPr txBox="1"/>
+          <p:nvPr/>
+        </p:nvSpPr>
+        <p:spPr>
+          <a:xfrm>
+            <a:off x="10027760" y="571500"/>
+            <a:ext cx="1783240" cy="707886"/>
+          </a:xfrm>
+          <a:prstGeom prst="rect">
+            <a:avLst/>
+          </a:prstGeom>
+          <a:noFill/>
+        </p:spPr>
+        <p:txBody>
+          <a:bodyPr wrap="square" rtlCol="0">
+            <a:spAutoFit/>
+          </a:bodyPr>
+          <a:lstStyle/>
+          <a:p>
+            <a:pPr algn="r"/>
+            <a:r>
+              <a:rPr lang="en-US" sz="2000" b="1" i="0" dirty="0">
+                <a:solidFill>
+                  <a:srgbClr val="202124"/>
+                </a:solidFill>
+                <a:effectLst/>
+                <a:latin typeface="Century Gothic" panose="020B0502020202020204" pitchFamily="34" charset="0"/>
+              </a:rPr>
+              <a:t>TYPHOON TISOY</a:t>
+            </a:r>
+            <a:endParaRPr lang="en-PH" sz="2000" b="1" dirty="0">
+              <a:latin typeface="Century Gothic" panose="020B0502020202020204" pitchFamily="34" charset="0"/>
+            </a:endParaRPr>
+          </a:p>
+        </p:txBody>
+      </p:sp>
+      <p:pic>
+        <p:nvPicPr>
+          <p:cNvPr id="33" name="Picture 32">
+            <a:extLst>
+              <a:ext uri="{FF2B5EF4-FFF2-40B4-BE49-F238E27FC236}">
+                <a16:creationId xmlns:a16="http://schemas.microsoft.com/office/drawing/2014/main" id="{AD15C8E0-F843-88DB-FBBA-AC7BD9BD65F0}"/>
+              </a:ext>
+            </a:extLst>
+          </p:cNvPr>
+          <p:cNvPicPr>
+            <a:picLocks noChangeAspect="1"/>
+          </p:cNvPicPr>
+          <p:nvPr/>
+        </p:nvPicPr>
+        <p:blipFill>
+          <a:blip r:embed="rId3" cstate="print">
+            <a:extLst>
+              <a:ext uri="{28A0092B-C50C-407E-A947-70E740481C1C}">
+                <a14:useLocalDpi xmlns:a14="http://schemas.microsoft.com/office/drawing/2010/main" val="0"/>
+              </a:ext>
+            </a:extLst>
+          </a:blip>
+          <a:stretch>
+            <a:fillRect/>
+          </a:stretch>
+        </p:blipFill>
+        <p:spPr>
+          <a:xfrm>
+            <a:off x="12877800" y="876300"/>
+            <a:ext cx="1544186" cy="1544186"/>
+          </a:xfrm>
+          <a:prstGeom prst="rect">
+            <a:avLst/>
+          </a:prstGeom>
+        </p:spPr>
+      </p:pic>
+      <p:sp>
+        <p:nvSpPr>
+          <p:cNvPr id="34" name="TextBox 33">
+            <a:extLst>
+              <a:ext uri="{FF2B5EF4-FFF2-40B4-BE49-F238E27FC236}">
+                <a16:creationId xmlns:a16="http://schemas.microsoft.com/office/drawing/2014/main" id="{2023C745-0CC6-F938-7BB2-2D6474F41D80}"/>
+              </a:ext>
+            </a:extLst>
+          </p:cNvPr>
+          <p:cNvSpPr txBox="1"/>
+          <p:nvPr/>
+        </p:nvSpPr>
+        <p:spPr>
+          <a:xfrm>
+            <a:off x="14613223" y="800100"/>
+            <a:ext cx="3307949" cy="1631216"/>
+          </a:xfrm>
+          <a:prstGeom prst="rect">
+            <a:avLst/>
+          </a:prstGeom>
+          <a:noFill/>
+        </p:spPr>
+        <p:txBody>
+          <a:bodyPr wrap="square" rtlCol="0">
+            <a:spAutoFit/>
+          </a:bodyPr>
+          <a:lstStyle/>
+          <a:p>
+            <a:r>
+              <a:rPr lang="en-US" sz="2000" b="1" i="0" dirty="0">
+                <a:solidFill>
+                  <a:srgbClr val="202124"/>
+                </a:solidFill>
+                <a:effectLst/>
+                <a:latin typeface="Century Gothic" panose="020B0502020202020204" pitchFamily="34" charset="0"/>
+              </a:rPr>
+              <a:t>TYPHOON TISOY  TYPHOON URSULA</a:t>
+            </a:r>
+          </a:p>
+          <a:p>
+            <a:r>
+              <a:rPr lang="en-US" sz="2000" b="1" i="0" dirty="0">
+                <a:solidFill>
+                  <a:srgbClr val="202124"/>
+                </a:solidFill>
+                <a:effectLst/>
+                <a:latin typeface="Century Gothic" panose="020B0502020202020204" pitchFamily="34" charset="0"/>
+              </a:rPr>
+              <a:t>TYPHOON QUIEL</a:t>
+            </a:r>
+          </a:p>
+          <a:p>
+            <a:r>
+              <a:rPr lang="en-US" sz="2000" b="1" i="0" dirty="0">
+                <a:solidFill>
+                  <a:srgbClr val="202124"/>
+                </a:solidFill>
+                <a:effectLst/>
+                <a:latin typeface="Century Gothic" panose="020B0502020202020204" pitchFamily="34" charset="0"/>
+              </a:rPr>
+              <a:t>TYPHOON HANNA</a:t>
+            </a:r>
+          </a:p>
+          <a:p>
+            <a:r>
+              <a:rPr lang="en-US" sz="2000" b="1" i="0" dirty="0">
+                <a:solidFill>
+                  <a:srgbClr val="202124"/>
+                </a:solidFill>
+                <a:effectLst/>
+                <a:latin typeface="Century Gothic" panose="020B0502020202020204" pitchFamily="34" charset="0"/>
+              </a:rPr>
+              <a:t>TYPHOON MARILYN</a:t>
+            </a:r>
+            <a:endParaRPr lang="en-PH" sz="2000" b="1" dirty="0">
+              <a:latin typeface="Century Gothic" panose="020B0502020202020204" pitchFamily="34" charset="0"/>
+            </a:endParaRPr>
+          </a:p>
+        </p:txBody>
+      </p:sp>
+      <p:pic>
+        <p:nvPicPr>
+          <p:cNvPr id="35" name="Picture 34">
+            <a:extLst>
+              <a:ext uri="{FF2B5EF4-FFF2-40B4-BE49-F238E27FC236}">
+                <a16:creationId xmlns:a16="http://schemas.microsoft.com/office/drawing/2014/main" id="{16E40E4E-C846-17DF-5606-37AE7201CCA3}"/>
+              </a:ext>
+            </a:extLst>
+          </p:cNvPr>
+          <p:cNvPicPr>
+            <a:picLocks noChangeAspect="1"/>
+          </p:cNvPicPr>
+          <p:nvPr/>
+        </p:nvPicPr>
+        <p:blipFill>
+          <a:blip r:embed="rId4">
+            <a:extLst>
+              <a:ext uri="{28A0092B-C50C-407E-A947-70E740481C1C}">
+                <a14:useLocalDpi xmlns:a14="http://schemas.microsoft.com/office/drawing/2010/main" val="0"/>
+              </a:ext>
+            </a:extLst>
+          </a:blip>
+          <a:stretch>
+            <a:fillRect/>
+          </a:stretch>
+        </p:blipFill>
+        <p:spPr>
+          <a:xfrm>
+            <a:off x="6123710" y="3054346"/>
+            <a:ext cx="11626852" cy="6861426"/>
+          </a:xfrm>
+          <a:prstGeom prst="rect">
+            <a:avLst/>
+          </a:prstGeom>
+          <a:ln w="38100">
+            <a:solidFill>
+              <a:schemeClr val="tx1"/>
+            </a:solidFill>
+          </a:ln>
+        </p:spPr>
+      </p:pic>
     </p:spTree>
   </p:cSld>
   <p:clrMapOvr>
@@ -4377,6 +4675,77 @@
           </a:p>
         </p:txBody>
       </p:sp>
+      <p:sp>
+        <p:nvSpPr>
+          <p:cNvPr id="20" name="object 5">
+            <a:extLst>
+              <a:ext uri="{FF2B5EF4-FFF2-40B4-BE49-F238E27FC236}">
+                <a16:creationId xmlns:a16="http://schemas.microsoft.com/office/drawing/2014/main" id="{72F22382-F02A-DEBE-1E87-409FC6A1B9B6}"/>
+              </a:ext>
+            </a:extLst>
+          </p:cNvPr>
+          <p:cNvSpPr txBox="1"/>
+          <p:nvPr/>
+        </p:nvSpPr>
+        <p:spPr>
+          <a:xfrm>
+            <a:off x="6833664" y="2105677"/>
+            <a:ext cx="10235136" cy="3167342"/>
+          </a:xfrm>
+          <a:prstGeom prst="rect">
+            <a:avLst/>
+          </a:prstGeom>
+        </p:spPr>
+        <p:txBody>
+          <a:bodyPr vert="horz" wrap="square" lIns="0" tIns="12065" rIns="0" bIns="0" rtlCol="0">
+            <a:spAutoFit/>
+          </a:bodyPr>
+          <a:lstStyle/>
+          <a:p>
+            <a:pPr algn="just">
+              <a:lnSpc>
+                <a:spcPct val="200000"/>
+              </a:lnSpc>
+              <a:spcAft>
+                <a:spcPts val="800"/>
+              </a:spcAft>
+            </a:pPr>
+            <a:r>
+              <a:rPr lang="en-US" sz="3600" dirty="0">
+                <a:effectLst/>
+                <a:latin typeface="Times New Roman" panose="02020603050405020304" pitchFamily="18" charset="0"/>
+                <a:ea typeface="Times New Roman" panose="02020603050405020304" pitchFamily="18" charset="0"/>
+                <a:cs typeface="Times New Roman" panose="02020603050405020304" pitchFamily="18" charset="0"/>
+              </a:rPr>
+              <a:t>Acquire the data about the Provinces who had the greatest and least number of affected individuals per typhoon (</a:t>
+            </a:r>
+            <a:r>
+              <a:rPr lang="en-US" sz="3600" dirty="0" err="1">
+                <a:effectLst/>
+                <a:latin typeface="Times New Roman" panose="02020603050405020304" pitchFamily="18" charset="0"/>
+                <a:ea typeface="Times New Roman" panose="02020603050405020304" pitchFamily="18" charset="0"/>
+                <a:cs typeface="Times New Roman" panose="02020603050405020304" pitchFamily="18" charset="0"/>
+              </a:rPr>
+              <a:t>Affected_Pers</a:t>
+            </a:r>
+            <a:r>
+              <a:rPr lang="en-US" sz="3600" dirty="0">
+                <a:effectLst/>
+                <a:latin typeface="Times New Roman" panose="02020603050405020304" pitchFamily="18" charset="0"/>
+                <a:ea typeface="Times New Roman" panose="02020603050405020304" pitchFamily="18" charset="0"/>
+                <a:cs typeface="Times New Roman" panose="02020603050405020304" pitchFamily="18" charset="0"/>
+              </a:rPr>
+              <a:t>).</a:t>
+            </a:r>
+            <a:endParaRPr lang="en-US" sz="4800" dirty="0">
+              <a:effectLst/>
+              <a:latin typeface="Times New Roman" panose="02020603050405020304" pitchFamily="18" charset="0"/>
+              <a:ea typeface="Calibri" panose="020F0502020204030204" pitchFamily="34" charset="0"/>
+              <a:cs typeface="Times New Roman" panose="02020603050405020304" pitchFamily="18" charset="0"/>
+            </a:endParaRPr>
+          </a:p>
+        </p:txBody>
+      </p:sp>
     </p:spTree>
   </p:cSld>
   <p:clrMapOvr>
@@ -5207,53 +5576,379 @@
           </a:p>
         </p:txBody>
       </p:sp>
-      <p:sp>
-        <p:nvSpPr>
-          <p:cNvPr id="26" name="Rectangle 25">
+      <p:pic>
+        <p:nvPicPr>
+          <p:cNvPr id="21" name="Picture 20">
             <a:extLst>
               <a:ext uri="{FF2B5EF4-FFF2-40B4-BE49-F238E27FC236}">
-                <a16:creationId xmlns:a16="http://schemas.microsoft.com/office/drawing/2014/main" id="{635B2392-45E8-9BA1-DD42-36ECABBE65E7}"/>
+                <a16:creationId xmlns:a16="http://schemas.microsoft.com/office/drawing/2014/main" id="{B7B83661-2DA1-49B0-8DEF-C7FAC9A15938}"/>
               </a:ext>
             </a:extLst>
           </p:cNvPr>
-          <p:cNvSpPr/>
-          <p:nvPr/>
-        </p:nvSpPr>
-        <p:spPr>
-          <a:xfrm>
-            <a:off x="6141744" y="590371"/>
-            <a:ext cx="11626852" cy="7556549"/>
+          <p:cNvPicPr>
+            <a:picLocks noChangeAspect="1"/>
+          </p:cNvPicPr>
+          <p:nvPr/>
+        </p:nvPicPr>
+        <p:blipFill>
+          <a:blip r:embed="rId2">
+            <a:extLst>
+              <a:ext uri="{28A0092B-C50C-407E-A947-70E740481C1C}">
+                <a14:useLocalDpi xmlns:a14="http://schemas.microsoft.com/office/drawing/2010/main" val="0"/>
+              </a:ext>
+            </a:extLst>
+          </a:blip>
+          <a:stretch>
+            <a:fillRect/>
+          </a:stretch>
+        </p:blipFill>
+        <p:spPr>
+          <a:xfrm>
+            <a:off x="6139252" y="380370"/>
+            <a:ext cx="11622813" cy="7763758"/>
           </a:xfrm>
           <a:prstGeom prst="rect">
             <a:avLst/>
           </a:prstGeom>
-        </p:spPr>
-        <p:style>
-          <a:lnRef idx="2">
-            <a:schemeClr val="dk1"/>
-          </a:lnRef>
-          <a:fillRef idx="1">
-            <a:schemeClr val="lt1"/>
-          </a:fillRef>
-          <a:effectRef idx="0">
-            <a:schemeClr val="dk1"/>
-          </a:effectRef>
-          <a:fontRef idx="minor">
-            <a:schemeClr val="dk1"/>
-          </a:fontRef>
-        </p:style>
-        <p:txBody>
-          <a:bodyPr rtlCol="0" anchor="ctr"/>
+          <a:ln w="38100">
+            <a:solidFill>
+              <a:schemeClr val="tx1"/>
+            </a:solidFill>
+          </a:ln>
+        </p:spPr>
+      </p:pic>
+      <p:sp>
+        <p:nvSpPr>
+          <p:cNvPr id="22" name="TextBox 21">
+            <a:extLst>
+              <a:ext uri="{FF2B5EF4-FFF2-40B4-BE49-F238E27FC236}">
+                <a16:creationId xmlns:a16="http://schemas.microsoft.com/office/drawing/2014/main" id="{A7BF7A17-FD23-38D3-68C6-9AA878036510}"/>
+              </a:ext>
+            </a:extLst>
+          </p:cNvPr>
+          <p:cNvSpPr txBox="1"/>
+          <p:nvPr/>
+        </p:nvSpPr>
+        <p:spPr>
+          <a:xfrm>
+            <a:off x="6172200" y="8431768"/>
+            <a:ext cx="1129937" cy="369332"/>
+          </a:xfrm>
+          <a:prstGeom prst="rect">
+            <a:avLst/>
+          </a:prstGeom>
+          <a:noFill/>
+        </p:spPr>
+        <p:txBody>
+          <a:bodyPr wrap="square" rtlCol="0">
+            <a:spAutoFit/>
+          </a:bodyPr>
+          <a:lstStyle/>
+          <a:p>
+            <a:r>
+              <a:rPr lang="en-US" b="1" dirty="0">
+                <a:latin typeface="Century Gothic" panose="020B0502020202020204" pitchFamily="34" charset="0"/>
+                <a:cs typeface="Times New Roman" panose="02020603050405020304" pitchFamily="18" charset="0"/>
+              </a:rPr>
+              <a:t>LEYTE</a:t>
+            </a:r>
+            <a:endParaRPr lang="en-PH" b="1" dirty="0">
+              <a:latin typeface="Century Gothic" panose="020B0502020202020204" pitchFamily="34" charset="0"/>
+              <a:cs typeface="Times New Roman" panose="02020603050405020304" pitchFamily="18" charset="0"/>
+            </a:endParaRPr>
+          </a:p>
+        </p:txBody>
+      </p:sp>
+      <p:sp>
+        <p:nvSpPr>
+          <p:cNvPr id="27" name="TextBox 26">
+            <a:extLst>
+              <a:ext uri="{FF2B5EF4-FFF2-40B4-BE49-F238E27FC236}">
+                <a16:creationId xmlns:a16="http://schemas.microsoft.com/office/drawing/2014/main" id="{6433253D-0A9D-CD0F-A819-6B34060EB65D}"/>
+              </a:ext>
+            </a:extLst>
+          </p:cNvPr>
+          <p:cNvSpPr txBox="1"/>
+          <p:nvPr/>
+        </p:nvSpPr>
+        <p:spPr>
+          <a:xfrm>
+            <a:off x="6934200" y="8865632"/>
+            <a:ext cx="3879532" cy="830997"/>
+          </a:xfrm>
+          <a:prstGeom prst="rect">
+            <a:avLst/>
+          </a:prstGeom>
+          <a:noFill/>
+        </p:spPr>
+        <p:txBody>
+          <a:bodyPr wrap="square" rtlCol="0">
+            <a:spAutoFit/>
+          </a:bodyPr>
+          <a:lstStyle/>
+          <a:p>
+            <a:r>
+              <a:rPr lang="en-PH" sz="4800" b="1" i="0" dirty="0">
+                <a:solidFill>
+                  <a:srgbClr val="202124"/>
+                </a:solidFill>
+                <a:effectLst/>
+                <a:latin typeface="Century Gothic" panose="020B0502020202020204" pitchFamily="34" charset="0"/>
+              </a:rPr>
+              <a:t>772162.0</a:t>
+            </a:r>
+            <a:endParaRPr lang="en-PH" sz="4800" b="1" dirty="0">
+              <a:latin typeface="Century Gothic" panose="020B0502020202020204" pitchFamily="34" charset="0"/>
+              <a:cs typeface="Times New Roman" panose="02020603050405020304" pitchFamily="18" charset="0"/>
+            </a:endParaRPr>
+          </a:p>
+        </p:txBody>
+      </p:sp>
+      <p:sp>
+        <p:nvSpPr>
+          <p:cNvPr id="33" name="TextBox 32">
+            <a:extLst>
+              <a:ext uri="{FF2B5EF4-FFF2-40B4-BE49-F238E27FC236}">
+                <a16:creationId xmlns:a16="http://schemas.microsoft.com/office/drawing/2014/main" id="{57B9DDA5-A36B-2A50-11D1-9E39B85F54A2}"/>
+              </a:ext>
+            </a:extLst>
+          </p:cNvPr>
+          <p:cNvSpPr txBox="1"/>
+          <p:nvPr/>
+        </p:nvSpPr>
+        <p:spPr>
+          <a:xfrm>
+            <a:off x="6781800" y="9521328"/>
+            <a:ext cx="2884469" cy="323165"/>
+          </a:xfrm>
+          <a:prstGeom prst="rect">
+            <a:avLst/>
+          </a:prstGeom>
+          <a:noFill/>
+        </p:spPr>
+        <p:txBody>
+          <a:bodyPr wrap="square" rtlCol="0">
+            <a:spAutoFit/>
+          </a:bodyPr>
           <a:lstStyle/>
           <a:p>
             <a:pPr algn="ctr"/>
             <a:r>
-              <a:rPr lang="en-US" dirty="0"/>
-              <a:t>GRAPH</a:t>
+              <a:rPr lang="en-US" sz="1500" b="1" dirty="0">
+                <a:latin typeface="Century Gothic" panose="020B0502020202020204" pitchFamily="34" charset="0"/>
+                <a:cs typeface="Times New Roman" panose="02020603050405020304" pitchFamily="18" charset="0"/>
+              </a:rPr>
+              <a:t>AFFECTED INDIVIDUALS</a:t>
             </a:r>
-          </a:p>
-        </p:txBody>
-      </p:sp>
+            <a:endParaRPr lang="en-PH" sz="1500" b="1" dirty="0">
+              <a:latin typeface="Century Gothic" panose="020B0502020202020204" pitchFamily="34" charset="0"/>
+              <a:cs typeface="Times New Roman" panose="02020603050405020304" pitchFamily="18" charset="0"/>
+            </a:endParaRPr>
+          </a:p>
+        </p:txBody>
+      </p:sp>
+      <p:pic>
+        <p:nvPicPr>
+          <p:cNvPr id="34" name="Picture 33">
+            <a:extLst>
+              <a:ext uri="{FF2B5EF4-FFF2-40B4-BE49-F238E27FC236}">
+                <a16:creationId xmlns:a16="http://schemas.microsoft.com/office/drawing/2014/main" id="{B1976F6A-5BEA-7912-2852-8153E1C7EDF9}"/>
+              </a:ext>
+            </a:extLst>
+          </p:cNvPr>
+          <p:cNvPicPr>
+            <a:picLocks noChangeAspect="1"/>
+          </p:cNvPicPr>
+          <p:nvPr/>
+        </p:nvPicPr>
+        <p:blipFill>
+          <a:blip r:embed="rId3" cstate="print">
+            <a:extLst>
+              <a:ext uri="{28A0092B-C50C-407E-A947-70E740481C1C}">
+                <a14:useLocalDpi xmlns:a14="http://schemas.microsoft.com/office/drawing/2010/main" val="0"/>
+              </a:ext>
+            </a:extLst>
+          </a:blip>
+          <a:stretch>
+            <a:fillRect/>
+          </a:stretch>
+        </p:blipFill>
+        <p:spPr>
+          <a:xfrm>
+            <a:off x="10280799" y="8634683"/>
+            <a:ext cx="1129937" cy="1129937"/>
+          </a:xfrm>
+          <a:prstGeom prst="rect">
+            <a:avLst/>
+          </a:prstGeom>
+        </p:spPr>
+      </p:pic>
+      <p:sp>
+        <p:nvSpPr>
+          <p:cNvPr id="35" name="TextBox 34">
+            <a:extLst>
+              <a:ext uri="{FF2B5EF4-FFF2-40B4-BE49-F238E27FC236}">
+                <a16:creationId xmlns:a16="http://schemas.microsoft.com/office/drawing/2014/main" id="{0D376061-4026-AF73-E5EE-CE5A1ED92DA3}"/>
+              </a:ext>
+            </a:extLst>
+          </p:cNvPr>
+          <p:cNvSpPr txBox="1"/>
+          <p:nvPr/>
+        </p:nvSpPr>
+        <p:spPr>
+          <a:xfrm>
+            <a:off x="12192000" y="8420100"/>
+            <a:ext cx="2024452" cy="369332"/>
+          </a:xfrm>
+          <a:prstGeom prst="rect">
+            <a:avLst/>
+          </a:prstGeom>
+          <a:noFill/>
+        </p:spPr>
+        <p:txBody>
+          <a:bodyPr wrap="square" rtlCol="0">
+            <a:spAutoFit/>
+          </a:bodyPr>
+          <a:lstStyle/>
+          <a:p>
+            <a:r>
+              <a:rPr lang="en-US" b="1" dirty="0">
+                <a:latin typeface="Century Gothic" panose="020B0502020202020204" pitchFamily="34" charset="0"/>
+                <a:cs typeface="Times New Roman" panose="02020603050405020304" pitchFamily="18" charset="0"/>
+              </a:rPr>
+              <a:t>WESTERN SAMAR</a:t>
+            </a:r>
+            <a:endParaRPr lang="en-PH" b="1" dirty="0">
+              <a:latin typeface="Century Gothic" panose="020B0502020202020204" pitchFamily="34" charset="0"/>
+              <a:cs typeface="Times New Roman" panose="02020603050405020304" pitchFamily="18" charset="0"/>
+            </a:endParaRPr>
+          </a:p>
+        </p:txBody>
+      </p:sp>
+      <p:sp>
+        <p:nvSpPr>
+          <p:cNvPr id="36" name="TextBox 35">
+            <a:extLst>
+              <a:ext uri="{FF2B5EF4-FFF2-40B4-BE49-F238E27FC236}">
+                <a16:creationId xmlns:a16="http://schemas.microsoft.com/office/drawing/2014/main" id="{C9BF7799-AEF9-CAC6-63DA-34FCCB9B0C16}"/>
+              </a:ext>
+            </a:extLst>
+          </p:cNvPr>
+          <p:cNvSpPr txBox="1"/>
+          <p:nvPr/>
+        </p:nvSpPr>
+        <p:spPr>
+          <a:xfrm>
+            <a:off x="13079217" y="8877300"/>
+            <a:ext cx="3303783" cy="830997"/>
+          </a:xfrm>
+          <a:prstGeom prst="rect">
+            <a:avLst/>
+          </a:prstGeom>
+          <a:noFill/>
+        </p:spPr>
+        <p:txBody>
+          <a:bodyPr wrap="square" rtlCol="0">
+            <a:spAutoFit/>
+          </a:bodyPr>
+          <a:lstStyle/>
+          <a:p>
+            <a:r>
+              <a:rPr lang="en-PH" sz="4800" b="1" i="0" dirty="0">
+                <a:solidFill>
+                  <a:srgbClr val="202124"/>
+                </a:solidFill>
+                <a:effectLst/>
+                <a:latin typeface="Century Gothic" panose="020B0502020202020204" pitchFamily="34" charset="0"/>
+              </a:rPr>
+              <a:t>483308.0</a:t>
+            </a:r>
+            <a:endParaRPr lang="en-PH" sz="4800" b="1" dirty="0">
+              <a:latin typeface="Century Gothic" panose="020B0502020202020204" pitchFamily="34" charset="0"/>
+              <a:cs typeface="Times New Roman" panose="02020603050405020304" pitchFamily="18" charset="0"/>
+            </a:endParaRPr>
+          </a:p>
+        </p:txBody>
+      </p:sp>
+      <p:sp>
+        <p:nvSpPr>
+          <p:cNvPr id="37" name="TextBox 36">
+            <a:extLst>
+              <a:ext uri="{FF2B5EF4-FFF2-40B4-BE49-F238E27FC236}">
+                <a16:creationId xmlns:a16="http://schemas.microsoft.com/office/drawing/2014/main" id="{54E26ED4-C216-D436-B799-FA283B0ACAC3}"/>
+              </a:ext>
+            </a:extLst>
+          </p:cNvPr>
+          <p:cNvSpPr txBox="1"/>
+          <p:nvPr/>
+        </p:nvSpPr>
+        <p:spPr>
+          <a:xfrm>
+            <a:off x="13030200" y="9535046"/>
+            <a:ext cx="2884469" cy="323165"/>
+          </a:xfrm>
+          <a:prstGeom prst="rect">
+            <a:avLst/>
+          </a:prstGeom>
+          <a:noFill/>
+        </p:spPr>
+        <p:txBody>
+          <a:bodyPr wrap="square" rtlCol="0">
+            <a:spAutoFit/>
+          </a:bodyPr>
+          <a:lstStyle/>
+          <a:p>
+            <a:pPr algn="ctr"/>
+            <a:r>
+              <a:rPr lang="en-US" sz="1500" b="1" dirty="0">
+                <a:latin typeface="Century Gothic" panose="020B0502020202020204" pitchFamily="34" charset="0"/>
+                <a:cs typeface="Times New Roman" panose="02020603050405020304" pitchFamily="18" charset="0"/>
+              </a:rPr>
+              <a:t>AFFECTED INDIVIDUALS</a:t>
+            </a:r>
+            <a:endParaRPr lang="en-PH" sz="1500" b="1" dirty="0">
+              <a:latin typeface="Century Gothic" panose="020B0502020202020204" pitchFamily="34" charset="0"/>
+              <a:cs typeface="Times New Roman" panose="02020603050405020304" pitchFamily="18" charset="0"/>
+            </a:endParaRPr>
+          </a:p>
+        </p:txBody>
+      </p:sp>
+      <p:pic>
+        <p:nvPicPr>
+          <p:cNvPr id="38" name="Picture 37">
+            <a:extLst>
+              <a:ext uri="{FF2B5EF4-FFF2-40B4-BE49-F238E27FC236}">
+                <a16:creationId xmlns:a16="http://schemas.microsoft.com/office/drawing/2014/main" id="{047F70C1-BEB5-8A91-FC0E-3A1DB52B7617}"/>
+              </a:ext>
+            </a:extLst>
+          </p:cNvPr>
+          <p:cNvPicPr>
+            <a:picLocks noChangeAspect="1"/>
+          </p:cNvPicPr>
+          <p:nvPr/>
+        </p:nvPicPr>
+        <p:blipFill>
+          <a:blip r:embed="rId4" cstate="print">
+            <a:extLst>
+              <a:ext uri="{28A0092B-C50C-407E-A947-70E740481C1C}">
+                <a14:useLocalDpi xmlns:a14="http://schemas.microsoft.com/office/drawing/2010/main" val="0"/>
+              </a:ext>
+            </a:extLst>
+          </a:blip>
+          <a:stretch>
+            <a:fillRect/>
+          </a:stretch>
+        </p:blipFill>
+        <p:spPr>
+          <a:xfrm>
+            <a:off x="16078200" y="8543637"/>
+            <a:ext cx="1344105" cy="1344105"/>
+          </a:xfrm>
+          <a:prstGeom prst="rect">
+            <a:avLst/>
+          </a:prstGeom>
+        </p:spPr>
+      </p:pic>
     </p:spTree>
   </p:cSld>
   <p:clrMapOvr>
@@ -6124,6 +6819,77 @@
           </a:p>
         </p:txBody>
       </p:sp>
+      <p:sp>
+        <p:nvSpPr>
+          <p:cNvPr id="20" name="object 5">
+            <a:extLst>
+              <a:ext uri="{FF2B5EF4-FFF2-40B4-BE49-F238E27FC236}">
+                <a16:creationId xmlns:a16="http://schemas.microsoft.com/office/drawing/2014/main" id="{30F2BF26-D886-B0FE-289D-CA105C2F9884}"/>
+              </a:ext>
+            </a:extLst>
+          </p:cNvPr>
+          <p:cNvSpPr txBox="1"/>
+          <p:nvPr/>
+        </p:nvSpPr>
+        <p:spPr>
+          <a:xfrm>
+            <a:off x="6858000" y="2172338"/>
+            <a:ext cx="10235136" cy="3167342"/>
+          </a:xfrm>
+          <a:prstGeom prst="rect">
+            <a:avLst/>
+          </a:prstGeom>
+        </p:spPr>
+        <p:txBody>
+          <a:bodyPr vert="horz" wrap="square" lIns="0" tIns="12065" rIns="0" bIns="0" rtlCol="0">
+            <a:spAutoFit/>
+          </a:bodyPr>
+          <a:lstStyle/>
+          <a:p>
+            <a:pPr algn="just">
+              <a:lnSpc>
+                <a:spcPct val="200000"/>
+              </a:lnSpc>
+              <a:spcAft>
+                <a:spcPts val="800"/>
+              </a:spcAft>
+            </a:pPr>
+            <a:r>
+              <a:rPr lang="en-US" sz="3600" dirty="0">
+                <a:effectLst/>
+                <a:latin typeface="Times New Roman" panose="02020603050405020304" pitchFamily="18" charset="0"/>
+                <a:ea typeface="Times New Roman" panose="02020603050405020304" pitchFamily="18" charset="0"/>
+                <a:cs typeface="Times New Roman" panose="02020603050405020304" pitchFamily="18" charset="0"/>
+              </a:rPr>
+              <a:t>Get the information that shows the top 5 municipalities who were most and least affected by typhoons from the year 2019 based from the </a:t>
+            </a:r>
+            <a:r>
+              <a:rPr lang="en-US" sz="3600" dirty="0" err="1">
+                <a:effectLst/>
+                <a:latin typeface="Times New Roman" panose="02020603050405020304" pitchFamily="18" charset="0"/>
+                <a:ea typeface="Times New Roman" panose="02020603050405020304" pitchFamily="18" charset="0"/>
+                <a:cs typeface="Times New Roman" panose="02020603050405020304" pitchFamily="18" charset="0"/>
+              </a:rPr>
+              <a:t>Affected_PERs</a:t>
+            </a:r>
+            <a:r>
+              <a:rPr lang="en-US" sz="3600" dirty="0">
+                <a:effectLst/>
+                <a:latin typeface="Times New Roman" panose="02020603050405020304" pitchFamily="18" charset="0"/>
+                <a:ea typeface="Times New Roman" panose="02020603050405020304" pitchFamily="18" charset="0"/>
+                <a:cs typeface="Times New Roman" panose="02020603050405020304" pitchFamily="18" charset="0"/>
+              </a:rPr>
+              <a:t> x variable. </a:t>
+            </a:r>
+            <a:endParaRPr lang="en-US" sz="4800" dirty="0">
+              <a:effectLst/>
+              <a:latin typeface="Times New Roman" panose="02020603050405020304" pitchFamily="18" charset="0"/>
+              <a:ea typeface="Calibri" panose="020F0502020204030204" pitchFamily="34" charset="0"/>
+              <a:cs typeface="Times New Roman" panose="02020603050405020304" pitchFamily="18" charset="0"/>
+            </a:endParaRPr>
+          </a:p>
+        </p:txBody>
+      </p:sp>
     </p:spTree>
   </p:cSld>
   <p:clrMapOvr>
@@ -6950,50 +7716,157 @@
           </a:p>
         </p:txBody>
       </p:sp>
-      <p:sp>
-        <p:nvSpPr>
-          <p:cNvPr id="21" name="Rectangle 20">
+      <p:pic>
+        <p:nvPicPr>
+          <p:cNvPr id="22" name="Picture 21">
             <a:extLst>
               <a:ext uri="{FF2B5EF4-FFF2-40B4-BE49-F238E27FC236}">
-                <a16:creationId xmlns:a16="http://schemas.microsoft.com/office/drawing/2014/main" id="{3166793B-EDA1-F28E-1B72-37CDBDAA2979}"/>
+                <a16:creationId xmlns:a16="http://schemas.microsoft.com/office/drawing/2014/main" id="{C5190582-7922-FEA3-AD6B-F3B480C44CE7}"/>
               </a:ext>
             </a:extLst>
           </p:cNvPr>
-          <p:cNvSpPr/>
-          <p:nvPr/>
-        </p:nvSpPr>
-        <p:spPr>
-          <a:xfrm>
-            <a:off x="6137027" y="308356"/>
-            <a:ext cx="11626852" cy="6905872"/>
+          <p:cNvPicPr>
+            <a:picLocks noChangeAspect="1"/>
+          </p:cNvPicPr>
+          <p:nvPr/>
+        </p:nvPicPr>
+        <p:blipFill>
+          <a:blip r:embed="rId3">
+            <a:extLst>
+              <a:ext uri="{28A0092B-C50C-407E-A947-70E740481C1C}">
+                <a14:useLocalDpi xmlns:a14="http://schemas.microsoft.com/office/drawing/2010/main" val="0"/>
+              </a:ext>
+            </a:extLst>
+          </a:blip>
+          <a:stretch>
+            <a:fillRect/>
+          </a:stretch>
+        </p:blipFill>
+        <p:spPr>
+          <a:xfrm>
+            <a:off x="6123710" y="190500"/>
+            <a:ext cx="11624182" cy="7020414"/>
           </a:xfrm>
           <a:prstGeom prst="rect">
             <a:avLst/>
           </a:prstGeom>
-        </p:spPr>
-        <p:style>
-          <a:lnRef idx="2">
-            <a:schemeClr val="dk1"/>
-          </a:lnRef>
-          <a:fillRef idx="1">
-            <a:schemeClr val="lt1"/>
-          </a:fillRef>
-          <a:effectRef idx="0">
-            <a:schemeClr val="dk1"/>
-          </a:effectRef>
-          <a:fontRef idx="minor">
-            <a:schemeClr val="dk1"/>
-          </a:fontRef>
-        </p:style>
-        <p:txBody>
-          <a:bodyPr rtlCol="0" anchor="ctr"/>
+          <a:ln w="38100">
+            <a:solidFill>
+              <a:schemeClr val="tx1"/>
+            </a:solidFill>
+          </a:ln>
+        </p:spPr>
+      </p:pic>
+      <p:sp>
+        <p:nvSpPr>
+          <p:cNvPr id="26" name="TextBox 25">
+            <a:extLst>
+              <a:ext uri="{FF2B5EF4-FFF2-40B4-BE49-F238E27FC236}">
+                <a16:creationId xmlns:a16="http://schemas.microsoft.com/office/drawing/2014/main" id="{90C2F186-8609-2A96-92AF-6193B246510B}"/>
+              </a:ext>
+            </a:extLst>
+          </p:cNvPr>
+          <p:cNvSpPr txBox="1"/>
+          <p:nvPr/>
+        </p:nvSpPr>
+        <p:spPr>
+          <a:xfrm>
+            <a:off x="6477000" y="7657862"/>
+            <a:ext cx="3429000" cy="1600438"/>
+          </a:xfrm>
+          <a:prstGeom prst="rect">
+            <a:avLst/>
+          </a:prstGeom>
+          <a:noFill/>
+        </p:spPr>
+        <p:txBody>
+          <a:bodyPr wrap="square" rtlCol="0">
+            <a:spAutoFit/>
+          </a:bodyPr>
           <a:lstStyle/>
           <a:p>
             <a:pPr algn="ctr"/>
             <a:r>
-              <a:rPr lang="en-US" dirty="0"/>
-              <a:t>GRAPH</a:t>
+              <a:rPr lang="en-US" sz="6600" b="1" dirty="0">
+                <a:latin typeface="Century Gothic" panose="020B0502020202020204" pitchFamily="34" charset="0"/>
+              </a:rPr>
+              <a:t>TOP 5</a:t>
             </a:r>
+          </a:p>
+          <a:p>
+            <a:pPr algn="ctr"/>
+            <a:r>
+              <a:rPr lang="en-US" sz="3200" b="1" dirty="0">
+                <a:latin typeface="Century Gothic" panose="020B0502020202020204" pitchFamily="34" charset="0"/>
+              </a:rPr>
+              <a:t>MUNICIPALITIES</a:t>
+            </a:r>
+            <a:endParaRPr lang="en-PH" sz="3200" b="1" dirty="0">
+              <a:latin typeface="Century Gothic" panose="020B0502020202020204" pitchFamily="34" charset="0"/>
+            </a:endParaRPr>
+          </a:p>
+        </p:txBody>
+      </p:sp>
+      <p:sp>
+        <p:nvSpPr>
+          <p:cNvPr id="27" name="TextBox 26">
+            <a:extLst>
+              <a:ext uri="{FF2B5EF4-FFF2-40B4-BE49-F238E27FC236}">
+                <a16:creationId xmlns:a16="http://schemas.microsoft.com/office/drawing/2014/main" id="{EFA79765-4572-6D9A-F307-38543AF2B78F}"/>
+              </a:ext>
+            </a:extLst>
+          </p:cNvPr>
+          <p:cNvSpPr txBox="1"/>
+          <p:nvPr/>
+        </p:nvSpPr>
+        <p:spPr>
+          <a:xfrm>
+            <a:off x="6477000" y="9186327"/>
+            <a:ext cx="3276600" cy="1138773"/>
+          </a:xfrm>
+          <a:prstGeom prst="rect">
+            <a:avLst/>
+          </a:prstGeom>
+          <a:noFill/>
+        </p:spPr>
+        <p:txBody>
+          <a:bodyPr wrap="square" rtlCol="0">
+            <a:spAutoFit/>
+          </a:bodyPr>
+          <a:lstStyle/>
+          <a:p>
+            <a:pPr algn="ctr"/>
+            <a:r>
+              <a:rPr lang="en-US" sz="1800" b="1" dirty="0">
+                <a:effectLst/>
+                <a:latin typeface="Times New Roman" panose="02020603050405020304" pitchFamily="18" charset="0"/>
+                <a:cs typeface="Times New Roman" panose="02020603050405020304" pitchFamily="18" charset="0"/>
+              </a:rPr>
+              <a:t> based from the </a:t>
+            </a:r>
+            <a:r>
+              <a:rPr lang="en-US" sz="1800" b="1" dirty="0" err="1">
+                <a:effectLst/>
+                <a:latin typeface="Times New Roman" panose="02020603050405020304" pitchFamily="18" charset="0"/>
+                <a:cs typeface="Times New Roman" panose="02020603050405020304" pitchFamily="18" charset="0"/>
+              </a:rPr>
+              <a:t>Affected_PERs</a:t>
+            </a:r>
+            <a:r>
+              <a:rPr lang="en-US" sz="1800" b="1" dirty="0">
+                <a:effectLst/>
+                <a:latin typeface="Times New Roman" panose="02020603050405020304" pitchFamily="18" charset="0"/>
+                <a:cs typeface="Times New Roman" panose="02020603050405020304" pitchFamily="18" charset="0"/>
+              </a:rPr>
+              <a:t> x variable.</a:t>
+            </a:r>
+          </a:p>
+          <a:p>
+            <a:pPr algn="ctr"/>
+            <a:endParaRPr lang="en-PH" sz="3200" b="1" dirty="0">
+              <a:latin typeface="Times New Roman" panose="02020603050405020304" pitchFamily="18" charset="0"/>
+              <a:cs typeface="Times New Roman" panose="02020603050405020304" pitchFamily="18" charset="0"/>
+            </a:endParaRPr>
           </a:p>
         </p:txBody>
       </p:sp>
@@ -26321,6 +27194,63 @@
           </a:p>
         </p:txBody>
       </p:sp>
+      <p:sp>
+        <p:nvSpPr>
+          <p:cNvPr id="20" name="TextBox 19">
+            <a:extLst>
+              <a:ext uri="{FF2B5EF4-FFF2-40B4-BE49-F238E27FC236}">
+                <a16:creationId xmlns:a16="http://schemas.microsoft.com/office/drawing/2014/main" id="{EC6614B3-4FE2-833D-7EC8-1179819007B3}"/>
+              </a:ext>
+            </a:extLst>
+          </p:cNvPr>
+          <p:cNvSpPr txBox="1"/>
+          <p:nvPr/>
+        </p:nvSpPr>
+        <p:spPr>
+          <a:xfrm>
+            <a:off x="6148821" y="1387366"/>
+            <a:ext cx="11427114" cy="6060313"/>
+          </a:xfrm>
+          <a:prstGeom prst="rect">
+            <a:avLst/>
+          </a:prstGeom>
+          <a:noFill/>
+        </p:spPr>
+        <p:txBody>
+          <a:bodyPr wrap="square">
+            <a:spAutoFit/>
+          </a:bodyPr>
+          <a:lstStyle/>
+          <a:p>
+            <a:pPr marL="0" marR="0" algn="just">
+              <a:lnSpc>
+                <a:spcPct val="200000"/>
+              </a:lnSpc>
+              <a:spcBef>
+                <a:spcPts val="0"/>
+              </a:spcBef>
+              <a:spcAft>
+                <a:spcPts val="0"/>
+              </a:spcAft>
+            </a:pPr>
+            <a:r>
+              <a:rPr lang="en-US" sz="4000" dirty="0">
+                <a:effectLst/>
+                <a:latin typeface="Times New Roman" panose="02020603050405020304" pitchFamily="18" charset="0"/>
+                <a:ea typeface="Times New Roman" panose="02020603050405020304" pitchFamily="18" charset="0"/>
+                <a:cs typeface="Times New Roman" panose="02020603050405020304" pitchFamily="18" charset="0"/>
+              </a:rPr>
+              <a:t>The HDX or The Humanitarian Data Exchange is an open platform for exchanging data between humanitarian organizations and disasters. HDX, launched in July 2014, aims to make humanitarian data more accessible and usable for research.</a:t>
+            </a:r>
+            <a:endParaRPr lang="en-US" sz="6000" dirty="0">
+              <a:effectLst/>
+              <a:latin typeface="Times New Roman" panose="02020603050405020304" pitchFamily="18" charset="0"/>
+              <a:ea typeface="Calibri" panose="020F0502020204030204" pitchFamily="34" charset="0"/>
+              <a:cs typeface="Times New Roman" panose="02020603050405020304" pitchFamily="18" charset="0"/>
+            </a:endParaRPr>
+          </a:p>
+        </p:txBody>
+      </p:sp>
     </p:spTree>
   </p:cSld>
   <p:clrMapOvr>
@@ -27192,6 +28122,62 @@
           </a:p>
         </p:txBody>
       </p:sp>
+      <p:sp>
+        <p:nvSpPr>
+          <p:cNvPr id="20" name="object 5">
+            <a:extLst>
+              <a:ext uri="{FF2B5EF4-FFF2-40B4-BE49-F238E27FC236}">
+                <a16:creationId xmlns:a16="http://schemas.microsoft.com/office/drawing/2014/main" id="{491922B9-B189-4778-139B-FDE16ED328E8}"/>
+              </a:ext>
+            </a:extLst>
+          </p:cNvPr>
+          <p:cNvSpPr txBox="1"/>
+          <p:nvPr/>
+        </p:nvSpPr>
+        <p:spPr>
+          <a:xfrm>
+            <a:off x="6563500" y="2094282"/>
+            <a:ext cx="10906036" cy="4749057"/>
+          </a:xfrm>
+          <a:prstGeom prst="rect">
+            <a:avLst/>
+          </a:prstGeom>
+        </p:spPr>
+        <p:txBody>
+          <a:bodyPr vert="horz" wrap="square" lIns="0" tIns="12065" rIns="0" bIns="0" rtlCol="0">
+            <a:spAutoFit/>
+          </a:bodyPr>
+          <a:lstStyle/>
+          <a:p>
+            <a:pPr algn="just">
+              <a:lnSpc>
+                <a:spcPct val="200000"/>
+              </a:lnSpc>
+              <a:spcAft>
+                <a:spcPts val="800"/>
+              </a:spcAft>
+            </a:pPr>
+            <a:r>
+              <a:rPr lang="en-US" sz="4000" dirty="0">
+                <a:effectLst/>
+                <a:latin typeface="Times New Roman" panose="02020603050405020304" pitchFamily="18" charset="0"/>
+                <a:ea typeface="Times New Roman" panose="02020603050405020304" pitchFamily="18" charset="0"/>
+                <a:cs typeface="Times New Roman" panose="02020603050405020304" pitchFamily="18" charset="0"/>
+              </a:rPr>
+              <a:t>Determine the top 5 typhoons from 2019 that brought the greatest and least number of infrastructure casualties to the Provinces in the Philippines based from Totally Damaged Houses x variable.</a:t>
+            </a:r>
+            <a:r>
+              <a:rPr lang="en-US" sz="4000" dirty="0">
+                <a:effectLst/>
+                <a:latin typeface="Times New Roman" panose="02020603050405020304" pitchFamily="18" charset="0"/>
+                <a:ea typeface="Calibri" panose="020F0502020204030204" pitchFamily="34" charset="0"/>
+                <a:cs typeface="Times New Roman" panose="02020603050405020304" pitchFamily="18" charset="0"/>
+              </a:rPr>
+              <a:t> </a:t>
+            </a:r>
+          </a:p>
+        </p:txBody>
+      </p:sp>
     </p:spTree>
   </p:cSld>
   <p:clrMapOvr>
@@ -28020,53 +29006,351 @@
           </a:p>
         </p:txBody>
       </p:sp>
-      <p:sp>
-        <p:nvSpPr>
-          <p:cNvPr id="4" name="Rectangle 3">
+      <p:pic>
+        <p:nvPicPr>
+          <p:cNvPr id="20" name="Picture 19">
             <a:extLst>
               <a:ext uri="{FF2B5EF4-FFF2-40B4-BE49-F238E27FC236}">
-                <a16:creationId xmlns:a16="http://schemas.microsoft.com/office/drawing/2014/main" id="{45815BD1-90F6-3068-71E2-EC2D4DF96BC6}"/>
+                <a16:creationId xmlns:a16="http://schemas.microsoft.com/office/drawing/2014/main" id="{775C31D7-59EB-43FC-BC54-6D6ED3596BD5}"/>
               </a:ext>
             </a:extLst>
           </p:cNvPr>
-          <p:cNvSpPr/>
-          <p:nvPr/>
-        </p:nvSpPr>
-        <p:spPr>
-          <a:xfrm>
-            <a:off x="6123710" y="3009900"/>
-            <a:ext cx="11626852" cy="6905872"/>
+          <p:cNvPicPr>
+            <a:picLocks noChangeAspect="1"/>
+          </p:cNvPicPr>
+          <p:nvPr/>
+        </p:nvPicPr>
+        <p:blipFill>
+          <a:blip r:embed="rId2" cstate="print">
+            <a:extLst>
+              <a:ext uri="{28A0092B-C50C-407E-A947-70E740481C1C}">
+                <a14:useLocalDpi xmlns:a14="http://schemas.microsoft.com/office/drawing/2010/main" val="0"/>
+              </a:ext>
+            </a:extLst>
+          </a:blip>
+          <a:stretch>
+            <a:fillRect/>
+          </a:stretch>
+        </p:blipFill>
+        <p:spPr>
+          <a:xfrm>
+            <a:off x="10114257" y="1008357"/>
+            <a:ext cx="1315743" cy="1315743"/>
           </a:xfrm>
           <a:prstGeom prst="rect">
             <a:avLst/>
           </a:prstGeom>
         </p:spPr>
-        <p:style>
-          <a:lnRef idx="2">
-            <a:schemeClr val="dk1"/>
-          </a:lnRef>
-          <a:fillRef idx="1">
-            <a:schemeClr val="lt1"/>
-          </a:fillRef>
-          <a:effectRef idx="0">
-            <a:schemeClr val="dk1"/>
-          </a:effectRef>
-          <a:fontRef idx="minor">
-            <a:schemeClr val="dk1"/>
-          </a:fontRef>
-        </p:style>
-        <p:txBody>
-          <a:bodyPr rtlCol="0" anchor="ctr"/>
-          <a:lstStyle/>
-          <a:p>
-            <a:pPr algn="ctr"/>
+      </p:pic>
+      <p:sp>
+        <p:nvSpPr>
+          <p:cNvPr id="21" name="TextBox 20">
+            <a:extLst>
+              <a:ext uri="{FF2B5EF4-FFF2-40B4-BE49-F238E27FC236}">
+                <a16:creationId xmlns:a16="http://schemas.microsoft.com/office/drawing/2014/main" id="{7A59F392-AFBC-F6BC-0332-6808F076186E}"/>
+              </a:ext>
+            </a:extLst>
+          </p:cNvPr>
+          <p:cNvSpPr txBox="1"/>
+          <p:nvPr/>
+        </p:nvSpPr>
+        <p:spPr>
+          <a:xfrm>
+            <a:off x="7082997" y="1047571"/>
+            <a:ext cx="3280203" cy="1200329"/>
+          </a:xfrm>
+          <a:prstGeom prst="rect">
+            <a:avLst/>
+          </a:prstGeom>
+          <a:noFill/>
+        </p:spPr>
+        <p:txBody>
+          <a:bodyPr wrap="square" rtlCol="0">
+            <a:spAutoFit/>
+          </a:bodyPr>
+          <a:lstStyle/>
+          <a:p>
             <a:r>
-              <a:rPr lang="en-US" dirty="0"/>
-              <a:t>GRAPH</a:t>
+              <a:rPr lang="en-PH" sz="7200" b="1" i="0" dirty="0">
+                <a:solidFill>
+                  <a:srgbClr val="202124"/>
+                </a:solidFill>
+                <a:effectLst/>
+                <a:latin typeface="Century Gothic" panose="020B0502020202020204" pitchFamily="34" charset="0"/>
+              </a:rPr>
+              <a:t>68,104</a:t>
             </a:r>
-          </a:p>
-        </p:txBody>
-      </p:sp>
+            <a:endParaRPr lang="en-PH" sz="7200" b="1" dirty="0">
+              <a:latin typeface="Century Gothic" panose="020B0502020202020204" pitchFamily="34" charset="0"/>
+            </a:endParaRPr>
+          </a:p>
+        </p:txBody>
+      </p:sp>
+      <p:sp>
+        <p:nvSpPr>
+          <p:cNvPr id="22" name="TextBox 21">
+            <a:extLst>
+              <a:ext uri="{FF2B5EF4-FFF2-40B4-BE49-F238E27FC236}">
+                <a16:creationId xmlns:a16="http://schemas.microsoft.com/office/drawing/2014/main" id="{CF3E5EF4-603F-6485-E89E-879338B258A6}"/>
+              </a:ext>
+            </a:extLst>
+          </p:cNvPr>
+          <p:cNvSpPr txBox="1"/>
+          <p:nvPr/>
+        </p:nvSpPr>
+        <p:spPr>
+          <a:xfrm>
+            <a:off x="6858000" y="2076390"/>
+            <a:ext cx="3624469" cy="400110"/>
+          </a:xfrm>
+          <a:prstGeom prst="rect">
+            <a:avLst/>
+          </a:prstGeom>
+          <a:noFill/>
+        </p:spPr>
+        <p:txBody>
+          <a:bodyPr wrap="square" rtlCol="0">
+            <a:spAutoFit/>
+          </a:bodyPr>
+          <a:lstStyle/>
+          <a:p>
+            <a:r>
+              <a:rPr lang="en-US" sz="2000" b="1" i="0" dirty="0">
+                <a:solidFill>
+                  <a:srgbClr val="202124"/>
+                </a:solidFill>
+                <a:effectLst/>
+                <a:latin typeface="Century Gothic" panose="020B0502020202020204" pitchFamily="34" charset="0"/>
+              </a:rPr>
+              <a:t>Totally Damaged</a:t>
+            </a:r>
+            <a:r>
+              <a:rPr lang="en-US" sz="2000" b="1" dirty="0">
+                <a:solidFill>
+                  <a:srgbClr val="202124"/>
+                </a:solidFill>
+                <a:latin typeface="Century Gothic" panose="020B0502020202020204" pitchFamily="34" charset="0"/>
+              </a:rPr>
+              <a:t> </a:t>
+            </a:r>
+            <a:r>
+              <a:rPr lang="en-US" sz="2000" b="1" i="0" dirty="0">
+                <a:solidFill>
+                  <a:srgbClr val="202124"/>
+                </a:solidFill>
+                <a:effectLst/>
+                <a:latin typeface="Century Gothic" panose="020B0502020202020204" pitchFamily="34" charset="0"/>
+              </a:rPr>
+              <a:t>Houses</a:t>
+            </a:r>
+            <a:endParaRPr lang="en-PH" sz="2000" b="1" dirty="0">
+              <a:latin typeface="Century Gothic" panose="020B0502020202020204" pitchFamily="34" charset="0"/>
+            </a:endParaRPr>
+          </a:p>
+        </p:txBody>
+      </p:sp>
+      <p:sp>
+        <p:nvSpPr>
+          <p:cNvPr id="26" name="TextBox 25">
+            <a:extLst>
+              <a:ext uri="{FF2B5EF4-FFF2-40B4-BE49-F238E27FC236}">
+                <a16:creationId xmlns:a16="http://schemas.microsoft.com/office/drawing/2014/main" id="{0B4A92BC-8103-97E2-F74F-AB7EC1D88871}"/>
+              </a:ext>
+            </a:extLst>
+          </p:cNvPr>
+          <p:cNvSpPr txBox="1"/>
+          <p:nvPr/>
+        </p:nvSpPr>
+        <p:spPr>
+          <a:xfrm>
+            <a:off x="10027760" y="571500"/>
+            <a:ext cx="1783240" cy="707886"/>
+          </a:xfrm>
+          <a:prstGeom prst="rect">
+            <a:avLst/>
+          </a:prstGeom>
+          <a:noFill/>
+        </p:spPr>
+        <p:txBody>
+          <a:bodyPr wrap="square" rtlCol="0">
+            <a:spAutoFit/>
+          </a:bodyPr>
+          <a:lstStyle/>
+          <a:p>
+            <a:pPr algn="r"/>
+            <a:r>
+              <a:rPr lang="en-US" sz="2000" b="1" i="0" dirty="0">
+                <a:solidFill>
+                  <a:srgbClr val="202124"/>
+                </a:solidFill>
+                <a:effectLst/>
+                <a:latin typeface="Century Gothic" panose="020B0502020202020204" pitchFamily="34" charset="0"/>
+              </a:rPr>
+              <a:t>TYPHOON TISOY</a:t>
+            </a:r>
+            <a:endParaRPr lang="en-PH" sz="2000" b="1" dirty="0">
+              <a:latin typeface="Century Gothic" panose="020B0502020202020204" pitchFamily="34" charset="0"/>
+            </a:endParaRPr>
+          </a:p>
+        </p:txBody>
+      </p:sp>
+      <p:pic>
+        <p:nvPicPr>
+          <p:cNvPr id="32" name="Picture 31">
+            <a:extLst>
+              <a:ext uri="{FF2B5EF4-FFF2-40B4-BE49-F238E27FC236}">
+                <a16:creationId xmlns:a16="http://schemas.microsoft.com/office/drawing/2014/main" id="{CBEFF06C-5335-945A-8944-1C4C2FE17D4B}"/>
+              </a:ext>
+            </a:extLst>
+          </p:cNvPr>
+          <p:cNvPicPr>
+            <a:picLocks noChangeAspect="1"/>
+          </p:cNvPicPr>
+          <p:nvPr/>
+        </p:nvPicPr>
+        <p:blipFill>
+          <a:blip r:embed="rId3" cstate="print">
+            <a:extLst>
+              <a:ext uri="{28A0092B-C50C-407E-A947-70E740481C1C}">
+                <a14:useLocalDpi xmlns:a14="http://schemas.microsoft.com/office/drawing/2010/main" val="0"/>
+              </a:ext>
+            </a:extLst>
+          </a:blip>
+          <a:stretch>
+            <a:fillRect/>
+          </a:stretch>
+        </p:blipFill>
+        <p:spPr>
+          <a:xfrm>
+            <a:off x="12877800" y="876300"/>
+            <a:ext cx="1544186" cy="1544186"/>
+          </a:xfrm>
+          <a:prstGeom prst="rect">
+            <a:avLst/>
+          </a:prstGeom>
+        </p:spPr>
+      </p:pic>
+      <p:sp>
+        <p:nvSpPr>
+          <p:cNvPr id="33" name="TextBox 32">
+            <a:extLst>
+              <a:ext uri="{FF2B5EF4-FFF2-40B4-BE49-F238E27FC236}">
+                <a16:creationId xmlns:a16="http://schemas.microsoft.com/office/drawing/2014/main" id="{90FF3968-7C58-EF21-B638-ACF00A082B6A}"/>
+              </a:ext>
+            </a:extLst>
+          </p:cNvPr>
+          <p:cNvSpPr txBox="1"/>
+          <p:nvPr/>
+        </p:nvSpPr>
+        <p:spPr>
+          <a:xfrm>
+            <a:off x="14613223" y="800100"/>
+            <a:ext cx="3307949" cy="1631216"/>
+          </a:xfrm>
+          <a:prstGeom prst="rect">
+            <a:avLst/>
+          </a:prstGeom>
+          <a:noFill/>
+        </p:spPr>
+        <p:txBody>
+          <a:bodyPr wrap="square" rtlCol="0">
+            <a:spAutoFit/>
+          </a:bodyPr>
+          <a:lstStyle/>
+          <a:p>
+            <a:r>
+              <a:rPr lang="en-US" sz="2000" b="1" i="0" dirty="0">
+                <a:solidFill>
+                  <a:srgbClr val="202124"/>
+                </a:solidFill>
+                <a:effectLst/>
+                <a:latin typeface="Century Gothic" panose="020B0502020202020204" pitchFamily="34" charset="0"/>
+              </a:rPr>
+              <a:t>TYPHOON TISOY  TYPHOON URSULA</a:t>
+            </a:r>
+          </a:p>
+          <a:p>
+            <a:r>
+              <a:rPr lang="en-US" sz="2000" b="1" i="0" dirty="0">
+                <a:solidFill>
+                  <a:srgbClr val="202124"/>
+                </a:solidFill>
+                <a:effectLst/>
+                <a:latin typeface="Century Gothic" panose="020B0502020202020204" pitchFamily="34" charset="0"/>
+              </a:rPr>
+              <a:t>TYPHOON QUIEL</a:t>
+            </a:r>
+          </a:p>
+          <a:p>
+            <a:r>
+              <a:rPr lang="en-US" sz="2000" b="1" i="0" dirty="0">
+                <a:solidFill>
+                  <a:srgbClr val="202124"/>
+                </a:solidFill>
+                <a:effectLst/>
+                <a:latin typeface="Century Gothic" panose="020B0502020202020204" pitchFamily="34" charset="0"/>
+              </a:rPr>
+              <a:t>TYPHOON HANNA</a:t>
+            </a:r>
+          </a:p>
+          <a:p>
+            <a:r>
+              <a:rPr lang="en-US" sz="2000" b="1" i="0" dirty="0">
+                <a:solidFill>
+                  <a:srgbClr val="202124"/>
+                </a:solidFill>
+                <a:effectLst/>
+                <a:latin typeface="Century Gothic" panose="020B0502020202020204" pitchFamily="34" charset="0"/>
+              </a:rPr>
+              <a:t>TYPHOON MARILYN</a:t>
+            </a:r>
+            <a:endParaRPr lang="en-PH" sz="2000" b="1" dirty="0">
+              <a:latin typeface="Century Gothic" panose="020B0502020202020204" pitchFamily="34" charset="0"/>
+            </a:endParaRPr>
+          </a:p>
+        </p:txBody>
+      </p:sp>
+      <p:pic>
+        <p:nvPicPr>
+          <p:cNvPr id="34" name="Picture 33">
+            <a:extLst>
+              <a:ext uri="{FF2B5EF4-FFF2-40B4-BE49-F238E27FC236}">
+                <a16:creationId xmlns:a16="http://schemas.microsoft.com/office/drawing/2014/main" id="{7FC8BFD5-E2CF-8CF8-D73C-4D1481B085A5}"/>
+              </a:ext>
+            </a:extLst>
+          </p:cNvPr>
+          <p:cNvPicPr>
+            <a:picLocks noChangeAspect="1"/>
+          </p:cNvPicPr>
+          <p:nvPr/>
+        </p:nvPicPr>
+        <p:blipFill>
+          <a:blip r:embed="rId4">
+            <a:extLst>
+              <a:ext uri="{28A0092B-C50C-407E-A947-70E740481C1C}">
+                <a14:useLocalDpi xmlns:a14="http://schemas.microsoft.com/office/drawing/2010/main" val="0"/>
+              </a:ext>
+            </a:extLst>
+          </a:blip>
+          <a:stretch>
+            <a:fillRect/>
+          </a:stretch>
+        </p:blipFill>
+        <p:spPr>
+          <a:xfrm>
+            <a:off x="6123710" y="2984548"/>
+            <a:ext cx="11626852" cy="7137704"/>
+          </a:xfrm>
+          <a:prstGeom prst="rect">
+            <a:avLst/>
+          </a:prstGeom>
+          <a:ln w="38100">
+            <a:solidFill>
+              <a:schemeClr val="tx1"/>
+            </a:solidFill>
+          </a:ln>
+        </p:spPr>
+      </p:pic>
     </p:spTree>
   </p:cSld>
   <p:clrMapOvr>

</xml_diff>

<commit_message>
Added Sources of Datasets in PPT
</commit_message>
<xml_diff>
--- a/Final PPT Template.pptx
+++ b/Final PPT Template.pptx
@@ -21796,6 +21796,348 @@
               <a:solidFill>
                 <a:schemeClr val="tx1"/>
               </a:solidFill>
+              <a:latin typeface="Verdana" panose="020B0604030504040204"/>
+              <a:cs typeface="Verdana" panose="020B0604030504040204"/>
+            </a:endParaRPr>
+          </a:p>
+        </p:txBody>
+      </p:sp>
+      <p:pic>
+        <p:nvPicPr>
+          <p:cNvPr id="10" name="Picture 9">
+            <a:extLst>
+              <a:ext uri="{FF2B5EF4-FFF2-40B4-BE49-F238E27FC236}">
+                <a16:creationId xmlns:a16="http://schemas.microsoft.com/office/drawing/2014/main" id="{5FFC12E2-2E78-B7B7-1052-EAF2317E2476}"/>
+              </a:ext>
+            </a:extLst>
+          </p:cNvPr>
+          <p:cNvPicPr>
+            <a:picLocks noChangeAspect="1"/>
+          </p:cNvPicPr>
+          <p:nvPr/>
+        </p:nvPicPr>
+        <p:blipFill>
+          <a:blip r:embed="rId2">
+            <a:extLst>
+              <a:ext uri="{28A0092B-C50C-407E-A947-70E740481C1C}">
+                <a14:useLocalDpi xmlns:a14="http://schemas.microsoft.com/office/drawing/2010/main" val="0"/>
+              </a:ext>
+            </a:extLst>
+          </a:blip>
+          <a:stretch>
+            <a:fillRect/>
+          </a:stretch>
+        </p:blipFill>
+        <p:spPr>
+          <a:xfrm>
+            <a:off x="1235445" y="5855883"/>
+            <a:ext cx="2734274" cy="3254210"/>
+          </a:xfrm>
+          <a:prstGeom prst="ellipse">
+            <a:avLst/>
+          </a:prstGeom>
+          <a:ln w="63500" cap="rnd">
+            <a:solidFill>
+              <a:srgbClr val="333333"/>
+            </a:solidFill>
+          </a:ln>
+          <a:effectLst>
+            <a:outerShdw blurRad="381000" dist="292100" dir="5400000" sx="-80000" sy="-18000" rotWithShape="0">
+              <a:srgbClr val="000000">
+                <a:alpha val="22000"/>
+              </a:srgbClr>
+            </a:outerShdw>
+          </a:effectLst>
+          <a:scene3d>
+            <a:camera prst="orthographicFront"/>
+            <a:lightRig rig="contrasting" dir="t">
+              <a:rot lat="0" lon="0" rev="3000000"/>
+            </a:lightRig>
+          </a:scene3d>
+          <a:sp3d contourW="7620">
+            <a:bevelT w="95250" h="31750"/>
+            <a:contourClr>
+              <a:srgbClr val="333333"/>
+            </a:contourClr>
+          </a:sp3d>
+        </p:spPr>
+      </p:pic>
+      <p:sp>
+        <p:nvSpPr>
+          <p:cNvPr id="12" name="object 8">
+            <a:extLst>
+              <a:ext uri="{FF2B5EF4-FFF2-40B4-BE49-F238E27FC236}">
+                <a16:creationId xmlns:a16="http://schemas.microsoft.com/office/drawing/2014/main" id="{021A3D38-2DF8-C62A-C2F2-E495B4F613BF}"/>
+              </a:ext>
+            </a:extLst>
+          </p:cNvPr>
+          <p:cNvSpPr txBox="1"/>
+          <p:nvPr/>
+        </p:nvSpPr>
+        <p:spPr>
+          <a:xfrm>
+            <a:off x="4664675" y="6175787"/>
+            <a:ext cx="3382010" cy="2976712"/>
+          </a:xfrm>
+          <a:prstGeom prst="rect">
+            <a:avLst/>
+          </a:prstGeom>
+        </p:spPr>
+        <p:txBody>
+          <a:bodyPr vert="horz" wrap="square" lIns="0" tIns="12700" rIns="0" bIns="0" rtlCol="0">
+            <a:spAutoFit/>
+          </a:bodyPr>
+          <a:lstStyle/>
+          <a:p>
+            <a:pPr marL="12700">
+              <a:lnSpc>
+                <a:spcPct val="100000"/>
+              </a:lnSpc>
+              <a:spcBef>
+                <a:spcPts val="100"/>
+              </a:spcBef>
+            </a:pPr>
+            <a:r>
+              <a:rPr lang="en-US" sz="2700" b="1" spc="-80" dirty="0">
+                <a:solidFill>
+                  <a:srgbClr val="111B1D"/>
+                </a:solidFill>
+                <a:latin typeface="Tahoma" panose="020B0604030504040204"/>
+                <a:cs typeface="Tahoma" panose="020B0604030504040204"/>
+              </a:rPr>
+              <a:t>HDX</a:t>
+            </a:r>
+          </a:p>
+          <a:p>
+            <a:pPr marL="12700">
+              <a:lnSpc>
+                <a:spcPct val="100000"/>
+              </a:lnSpc>
+              <a:spcBef>
+                <a:spcPts val="100"/>
+              </a:spcBef>
+            </a:pPr>
+            <a:endParaRPr sz="2700" dirty="0">
+              <a:latin typeface="Tahoma" panose="020B0604030504040204"/>
+              <a:cs typeface="Tahoma" panose="020B0604030504040204"/>
+            </a:endParaRPr>
+          </a:p>
+          <a:p>
+            <a:pPr marL="12700" marR="5080">
+              <a:lnSpc>
+                <a:spcPct val="125000"/>
+              </a:lnSpc>
+            </a:pPr>
+            <a:endParaRPr lang="en-US" sz="1600" dirty="0">
+              <a:effectLst/>
+              <a:latin typeface="Verdana" panose="020B0604030504040204" pitchFamily="34" charset="0"/>
+              <a:ea typeface="Verdana" panose="020B0604030504040204" pitchFamily="34" charset="0"/>
+            </a:endParaRPr>
+          </a:p>
+          <a:p>
+            <a:pPr marL="12700" marR="5080">
+              <a:lnSpc>
+                <a:spcPct val="125000"/>
+              </a:lnSpc>
+            </a:pPr>
+            <a:endParaRPr lang="en-US" sz="1600" dirty="0">
+              <a:effectLst/>
+              <a:latin typeface="Verdana" panose="020B0604030504040204" pitchFamily="34" charset="0"/>
+              <a:ea typeface="Verdana" panose="020B0604030504040204" pitchFamily="34" charset="0"/>
+            </a:endParaRPr>
+          </a:p>
+          <a:p>
+            <a:pPr marL="12700" marR="5080">
+              <a:lnSpc>
+                <a:spcPct val="125000"/>
+              </a:lnSpc>
+            </a:pPr>
+            <a:r>
+              <a:rPr lang="en-US" sz="1600" dirty="0">
+                <a:effectLst/>
+                <a:latin typeface="Verdana" panose="020B0604030504040204" pitchFamily="34" charset="0"/>
+                <a:ea typeface="Verdana" panose="020B0604030504040204" pitchFamily="34" charset="0"/>
+              </a:rPr>
+              <a:t>An open platform for sharing data across crises and organizations</a:t>
+            </a:r>
+            <a:r>
+              <a:rPr lang="en-US" sz="1600" dirty="0">
+                <a:latin typeface="Verdana" panose="020B0604030504040204" pitchFamily="34" charset="0"/>
+                <a:ea typeface="Verdana" panose="020B0604030504040204" pitchFamily="34" charset="0"/>
+              </a:rPr>
+              <a:t> and goal of it </a:t>
+            </a:r>
+            <a:r>
+              <a:rPr lang="en-US" sz="1600" b="0" i="0" dirty="0">
+                <a:solidFill>
+                  <a:srgbClr val="333333"/>
+                </a:solidFill>
+                <a:effectLst/>
+                <a:latin typeface="Verdana" panose="020B0604030504040204" pitchFamily="34" charset="0"/>
+                <a:ea typeface="Verdana" panose="020B0604030504040204" pitchFamily="34" charset="0"/>
+              </a:rPr>
+              <a:t>to make humanitarian data easy to find and use for analysis.</a:t>
+            </a:r>
+            <a:endParaRPr lang="en-US" sz="1600" dirty="0">
+              <a:effectLst/>
+              <a:latin typeface="Verdana" panose="020B0604030504040204" pitchFamily="34" charset="0"/>
+              <a:ea typeface="Verdana" panose="020B0604030504040204" pitchFamily="34" charset="0"/>
+            </a:endParaRPr>
+          </a:p>
+        </p:txBody>
+      </p:sp>
+      <p:pic>
+        <p:nvPicPr>
+          <p:cNvPr id="13" name="Picture 12">
+            <a:extLst>
+              <a:ext uri="{FF2B5EF4-FFF2-40B4-BE49-F238E27FC236}">
+                <a16:creationId xmlns:a16="http://schemas.microsoft.com/office/drawing/2014/main" id="{C42C5348-C942-9A25-9428-0B0A073842C8}"/>
+              </a:ext>
+            </a:extLst>
+          </p:cNvPr>
+          <p:cNvPicPr>
+            <a:picLocks noChangeAspect="1"/>
+          </p:cNvPicPr>
+          <p:nvPr/>
+        </p:nvPicPr>
+        <p:blipFill>
+          <a:blip r:embed="rId3">
+            <a:extLst>
+              <a:ext uri="{28A0092B-C50C-407E-A947-70E740481C1C}">
+                <a14:useLocalDpi xmlns:a14="http://schemas.microsoft.com/office/drawing/2010/main" val="0"/>
+              </a:ext>
+            </a:extLst>
+          </a:blip>
+          <a:stretch>
+            <a:fillRect/>
+          </a:stretch>
+        </p:blipFill>
+        <p:spPr>
+          <a:xfrm>
+            <a:off x="10363200" y="5816113"/>
+            <a:ext cx="2858965" cy="3333750"/>
+          </a:xfrm>
+          <a:prstGeom prst="ellipse">
+            <a:avLst/>
+          </a:prstGeom>
+          <a:ln w="63500" cap="rnd">
+            <a:solidFill>
+              <a:srgbClr val="333333"/>
+            </a:solidFill>
+          </a:ln>
+          <a:effectLst>
+            <a:outerShdw blurRad="381000" dist="292100" dir="5400000" sx="-80000" sy="-18000" rotWithShape="0">
+              <a:srgbClr val="000000">
+                <a:alpha val="22000"/>
+              </a:srgbClr>
+            </a:outerShdw>
+          </a:effectLst>
+          <a:scene3d>
+            <a:camera prst="orthographicFront"/>
+            <a:lightRig rig="contrasting" dir="t">
+              <a:rot lat="0" lon="0" rev="3000000"/>
+            </a:lightRig>
+          </a:scene3d>
+          <a:sp3d contourW="7620">
+            <a:bevelT w="95250" h="31750"/>
+            <a:contourClr>
+              <a:srgbClr val="333333"/>
+            </a:contourClr>
+          </a:sp3d>
+        </p:spPr>
+      </p:pic>
+      <p:sp>
+        <p:nvSpPr>
+          <p:cNvPr id="14" name="object 12">
+            <a:extLst>
+              <a:ext uri="{FF2B5EF4-FFF2-40B4-BE49-F238E27FC236}">
+                <a16:creationId xmlns:a16="http://schemas.microsoft.com/office/drawing/2014/main" id="{202123E3-7C4D-C5D7-6E58-3BA9120156A0}"/>
+              </a:ext>
+            </a:extLst>
+          </p:cNvPr>
+          <p:cNvSpPr txBox="1"/>
+          <p:nvPr/>
+        </p:nvSpPr>
+        <p:spPr>
+          <a:xfrm>
+            <a:off x="13534390" y="6134100"/>
+            <a:ext cx="3382010" cy="3395032"/>
+          </a:xfrm>
+          <a:prstGeom prst="rect">
+            <a:avLst/>
+          </a:prstGeom>
+        </p:spPr>
+        <p:txBody>
+          <a:bodyPr vert="horz" wrap="square" lIns="0" tIns="12700" rIns="0" bIns="0" rtlCol="0">
+            <a:spAutoFit/>
+          </a:bodyPr>
+          <a:lstStyle/>
+          <a:p>
+            <a:pPr marL="12700" marR="1285875">
+              <a:lnSpc>
+                <a:spcPct val="107000"/>
+              </a:lnSpc>
+              <a:spcBef>
+                <a:spcPts val="100"/>
+              </a:spcBef>
+            </a:pPr>
+            <a:r>
+              <a:rPr lang="en-US" sz="2700" b="1" spc="-85" dirty="0">
+                <a:solidFill>
+                  <a:srgbClr val="111B1D"/>
+                </a:solidFill>
+                <a:latin typeface="Tahoma" panose="020B0604030504040204"/>
+                <a:cs typeface="Tahoma" panose="020B0604030504040204"/>
+              </a:rPr>
+              <a:t>CRED</a:t>
+            </a:r>
+            <a:endParaRPr sz="2700" dirty="0">
+              <a:latin typeface="Tahoma" panose="020B0604030504040204"/>
+              <a:cs typeface="Tahoma" panose="020B0604030504040204"/>
+            </a:endParaRPr>
+          </a:p>
+          <a:p>
+            <a:pPr marL="12700" marR="5080">
+              <a:lnSpc>
+                <a:spcPct val="125000"/>
+              </a:lnSpc>
+            </a:pPr>
+            <a:endParaRPr lang="en-US" sz="4250" dirty="0">
+              <a:latin typeface="Tahoma" panose="020B0604030504040204"/>
+              <a:cs typeface="Tahoma" panose="020B0604030504040204"/>
+            </a:endParaRPr>
+          </a:p>
+          <a:p>
+            <a:pPr marL="12700" marR="5080">
+              <a:lnSpc>
+                <a:spcPct val="125000"/>
+              </a:lnSpc>
+            </a:pPr>
+            <a:endParaRPr lang="en-US" sz="1600" spc="105" dirty="0">
+              <a:solidFill>
+                <a:srgbClr val="111B1D"/>
+              </a:solidFill>
+              <a:latin typeface="Verdana" panose="020B0604030504040204"/>
+              <a:cs typeface="Verdana" panose="020B0604030504040204"/>
+            </a:endParaRPr>
+          </a:p>
+          <a:p>
+            <a:pPr marL="12700" marR="5080">
+              <a:lnSpc>
+                <a:spcPct val="125000"/>
+              </a:lnSpc>
+            </a:pPr>
+            <a:r>
+              <a:rPr lang="en-US" sz="1600" spc="105" dirty="0">
+                <a:solidFill>
+                  <a:srgbClr val="111B1D"/>
+                </a:solidFill>
+                <a:latin typeface="Verdana" panose="020B0604030504040204"/>
+                <a:cs typeface="Verdana" panose="020B0604030504040204"/>
+              </a:rPr>
+              <a:t>The Centre promotes research, training and technical expertise on humanitarian emergencies, particularly in public health and epidemiology.</a:t>
+            </a:r>
+            <a:endParaRPr sz="1600" dirty="0">
               <a:latin typeface="Verdana" panose="020B0604030504040204"/>
               <a:cs typeface="Verdana" panose="020B0604030504040204"/>
             </a:endParaRPr>

</xml_diff>

<commit_message>
Added a problem statement in the ppt
</commit_message>
<xml_diff>
--- a/Final PPT Template.pptx
+++ b/Final PPT Template.pptx
@@ -236,7 +236,7 @@
           <a:p>
             <a:fld id="{1E1C856F-118E-4DAC-AF8B-BD168E7EC128}" type="datetimeFigureOut">
               <a:rPr lang="en-PH" smtClean="0"/>
-              <a:t>05/06/2022</a:t>
+              <a:t>06/06/2022</a:t>
             </a:fld>
             <a:endParaRPr lang="en-PH"/>
           </a:p>
@@ -959,7 +959,7 @@
           <a:p>
             <a:fld id="{1D8BD707-D9CF-40AE-B4C6-C98DA3205C09}" type="datetimeFigureOut">
               <a:rPr lang="en-US"/>
-              <a:t>6/5/2022</a:t>
+              <a:t>6/6/2022</a:t>
             </a:fld>
             <a:endParaRPr lang="en-US"/>
           </a:p>
@@ -1137,7 +1137,7 @@
           <a:p>
             <a:fld id="{1D8BD707-D9CF-40AE-B4C6-C98DA3205C09}" type="datetimeFigureOut">
               <a:rPr lang="en-US"/>
-              <a:t>6/5/2022</a:t>
+              <a:t>6/6/2022</a:t>
             </a:fld>
             <a:endParaRPr lang="en-US"/>
           </a:p>
@@ -1352,7 +1352,7 @@
           <a:p>
             <a:fld id="{1D8BD707-D9CF-40AE-B4C6-C98DA3205C09}" type="datetimeFigureOut">
               <a:rPr lang="en-US"/>
-              <a:t>6/5/2022</a:t>
+              <a:t>6/6/2022</a:t>
             </a:fld>
             <a:endParaRPr lang="en-US"/>
           </a:p>
@@ -1501,7 +1501,7 @@
           <a:p>
             <a:fld id="{1D8BD707-D9CF-40AE-B4C6-C98DA3205C09}" type="datetimeFigureOut">
               <a:rPr lang="en-US"/>
-              <a:t>6/5/2022</a:t>
+              <a:t>6/6/2022</a:t>
             </a:fld>
             <a:endParaRPr lang="en-US"/>
           </a:p>
@@ -1621,7 +1621,7 @@
           <a:p>
             <a:fld id="{1D8BD707-D9CF-40AE-B4C6-C98DA3205C09}" type="datetimeFigureOut">
               <a:rPr lang="en-US"/>
-              <a:t>6/5/2022</a:t>
+              <a:t>6/6/2022</a:t>
             </a:fld>
             <a:endParaRPr lang="en-US"/>
           </a:p>
@@ -1847,7 +1847,7 @@
           <a:p>
             <a:fld id="{1D8BD707-D9CF-40AE-B4C6-C98DA3205C09}" type="datetimeFigureOut">
               <a:rPr lang="en-US"/>
-              <a:t>6/5/2022</a:t>
+              <a:t>6/6/2022</a:t>
             </a:fld>
             <a:endParaRPr lang="en-US"/>
           </a:p>
@@ -26733,6 +26733,58 @@
           <a:lstStyle/>
           <a:p>
             <a:endParaRPr/>
+          </a:p>
+        </p:txBody>
+      </p:sp>
+      <p:sp>
+        <p:nvSpPr>
+          <p:cNvPr id="9" name="object 9">
+            <a:extLst>
+              <a:ext uri="{FF2B5EF4-FFF2-40B4-BE49-F238E27FC236}">
+                <a16:creationId xmlns:a16="http://schemas.microsoft.com/office/drawing/2014/main" id="{22D30D91-962E-E65F-6E07-4C355815AC34}"/>
+              </a:ext>
+            </a:extLst>
+          </p:cNvPr>
+          <p:cNvSpPr txBox="1"/>
+          <p:nvPr/>
+        </p:nvSpPr>
+        <p:spPr>
+          <a:xfrm>
+            <a:off x="9601200" y="2743270"/>
+            <a:ext cx="8382000" cy="5320367"/>
+          </a:xfrm>
+          <a:prstGeom prst="rect">
+            <a:avLst/>
+          </a:prstGeom>
+        </p:spPr>
+        <p:txBody>
+          <a:bodyPr vert="horz" wrap="square" lIns="0" tIns="12700" rIns="0" bIns="0" rtlCol="0">
+            <a:spAutoFit/>
+          </a:bodyPr>
+          <a:lstStyle/>
+          <a:p>
+            <a:pPr marL="12700" marR="5080">
+              <a:lnSpc>
+                <a:spcPct val="125000"/>
+              </a:lnSpc>
+              <a:spcBef>
+                <a:spcPts val="1555"/>
+              </a:spcBef>
+            </a:pPr>
+            <a:r>
+              <a:rPr lang="en-US" sz="4000" spc="105" dirty="0">
+                <a:solidFill>
+                  <a:srgbClr val="111B1D"/>
+                </a:solidFill>
+                <a:latin typeface="Century Gothic" panose="020B0502020202020204" pitchFamily="34" charset="0"/>
+                <a:cs typeface="Verdana" panose="020B0604030504040204"/>
+              </a:rPr>
+              <a:t>The primary issue addressed by this project is the lack of a mitigation and response framework among the cities and municipalities located throughout the Philippine archipelago. </a:t>
+            </a:r>
+            <a:endParaRPr lang="en-US" sz="4000" dirty="0">
+              <a:latin typeface="Century Gothic" panose="020B0502020202020204" pitchFamily="34" charset="0"/>
+              <a:cs typeface="Verdana" panose="020B0604030504040204"/>
+            </a:endParaRPr>
           </a:p>
         </p:txBody>
       </p:sp>

</xml_diff>